<commit_message>
Updated lesson 26 slides to add in in-class programming assignment.
</commit_message>
<xml_diff>
--- a/notes/L26/Lsn26.pptx
+++ b/notes/L26/Lsn26.pptx
@@ -5,10 +5,10 @@
     <p:sldMasterId id="2147483648" r:id="rId1"/>
   </p:sldMasterIdLst>
   <p:notesMasterIdLst>
-    <p:notesMasterId r:id="rId21"/>
+    <p:notesMasterId r:id="rId22"/>
   </p:notesMasterIdLst>
   <p:handoutMasterIdLst>
-    <p:handoutMasterId r:id="rId22"/>
+    <p:handoutMasterId r:id="rId23"/>
   </p:handoutMasterIdLst>
   <p:sldIdLst>
     <p:sldId id="282" r:id="rId2"/>
@@ -28,8 +28,9 @@
     <p:sldId id="471" r:id="rId16"/>
     <p:sldId id="478" r:id="rId17"/>
     <p:sldId id="474" r:id="rId18"/>
-    <p:sldId id="472" r:id="rId19"/>
-    <p:sldId id="476" r:id="rId20"/>
+    <p:sldId id="479" r:id="rId19"/>
+    <p:sldId id="472" r:id="rId20"/>
+    <p:sldId id="476" r:id="rId21"/>
   </p:sldIdLst>
   <p:sldSz cx="9144000" cy="6858000" type="screen4x3"/>
   <p:notesSz cx="6985000" cy="9283700"/>
@@ -7926,16 +7927,6 @@
               <a:buNone/>
             </a:pPr>
             <a:r>
-              <a:rPr lang="en-US" sz="1400" b="1" dirty="0">
-                <a:solidFill>
-                  <a:schemeClr val="accent2"/>
-                </a:solidFill>
-                <a:latin typeface="Courier New" pitchFamily="49" charset="0"/>
-                <a:cs typeface="Courier New" pitchFamily="49" charset="0"/>
-              </a:rPr>
-              <a:t>int main(void</a:t>
-            </a:r>
-            <a:r>
               <a:rPr lang="en-US" sz="1400" b="1" dirty="0" smtClean="0">
                 <a:solidFill>
                   <a:schemeClr val="accent2"/>
@@ -7943,7 +7934,7 @@
                 <a:latin typeface="Courier New" pitchFamily="49" charset="0"/>
                 <a:cs typeface="Courier New" pitchFamily="49" charset="0"/>
               </a:rPr>
-              <a:t>) {</a:t>
+              <a:t>void main(void) {</a:t>
             </a:r>
             <a:endParaRPr lang="en-US" sz="1400" b="1" dirty="0">
               <a:solidFill>
@@ -8590,21 +8581,6 @@
               <a:latin typeface="Courier New" pitchFamily="49" charset="0"/>
               <a:cs typeface="Courier New" pitchFamily="49" charset="0"/>
             </a:endParaRPr>
-          </a:p>
-          <a:p>
-            <a:pPr marL="57150" indent="0">
-              <a:buNone/>
-            </a:pPr>
-            <a:r>
-              <a:rPr lang="en-US" sz="1400" b="1" dirty="0">
-                <a:solidFill>
-                  <a:schemeClr val="accent2"/>
-                </a:solidFill>
-                <a:latin typeface="Courier New" pitchFamily="49" charset="0"/>
-                <a:cs typeface="Courier New" pitchFamily="49" charset="0"/>
-              </a:rPr>
-              <a:t>    return 0;</a:t>
-            </a:r>
           </a:p>
           <a:p>
             <a:pPr marL="57150" indent="0">
@@ -10478,11 +10454,11 @@
   <p:clrMapOvr>
     <a:masterClrMapping/>
   </p:clrMapOvr>
-  <mc:AlternateContent xmlns:mc="http://schemas.openxmlformats.org/markup-compatibility/2006">
-    <mc:Choice xmlns:p14="http://schemas.microsoft.com/office/powerpoint/2010/main" Requires="p14">
+  <mc:AlternateContent xmlns:mc="http://schemas.openxmlformats.org/markup-compatibility/2006" xmlns:p14="http://schemas.microsoft.com/office/powerpoint/2010/main">
+    <mc:Choice Requires="p14">
       <p:transition spd="slow" p14:dur="2000"/>
     </mc:Choice>
-    <mc:Fallback>
+    <mc:Fallback xmlns="">
       <p:transition spd="slow"/>
     </mc:Fallback>
   </mc:AlternateContent>
@@ -12067,20 +12043,420 @@
           <a:lstStyle/>
           <a:p>
             <a:r>
+              <a:rPr lang="en-US" dirty="0" smtClean="0"/>
+              <a:t>In-Class Programming</a:t>
+            </a:r>
+            <a:endParaRPr lang="en-US" dirty="0"/>
+          </a:p>
+        </p:txBody>
+      </p:sp>
+      <mc:AlternateContent xmlns:mc="http://schemas.openxmlformats.org/markup-compatibility/2006" xmlns:a14="http://schemas.microsoft.com/office/drawing/2010/main">
+        <mc:Choice Requires="a14">
+          <p:sp>
+            <p:nvSpPr>
+              <p:cNvPr id="3" name="Content Placeholder 2"/>
+              <p:cNvSpPr>
+                <a:spLocks noGrp="1"/>
+              </p:cNvSpPr>
+              <p:nvPr>
+                <p:ph idx="1"/>
+              </p:nvPr>
+            </p:nvSpPr>
+            <p:spPr/>
+            <p:txBody>
+              <a:bodyPr/>
+              <a:lstStyle/>
+              <a:p>
+                <a:r>
+                  <a:rPr lang="en-US" dirty="0" smtClean="0"/>
+                  <a:t>Create a C </a:t>
+                </a:r>
+                <a:r>
+                  <a:rPr lang="en-US" dirty="0"/>
+                  <a:t>program </a:t>
+                </a:r>
+                <a:r>
+                  <a:rPr lang="en-US" dirty="0" smtClean="0"/>
+                  <a:t>that utilizes </a:t>
+                </a:r>
+                <a:r>
+                  <a:rPr lang="en-US" dirty="0"/>
+                  <a:t>interrupts to Blink the Green LED </a:t>
+                </a:r>
+                <a:r>
+                  <a:rPr lang="en-US" dirty="0" smtClean="0"/>
+                  <a:t>(i.e. P1.6) using </a:t>
+                </a:r>
+                <a:r>
+                  <a:rPr lang="en-US" dirty="0"/>
+                  <a:t>Timer </a:t>
+                </a:r>
+                <a:r>
+                  <a:rPr lang="en-US" dirty="0" smtClean="0"/>
+                  <a:t>A to create a 16ms delay.</a:t>
+                </a:r>
+              </a:p>
+              <a:p>
+                <a:r>
+                  <a:rPr lang="en-US" sz="2400" dirty="0" smtClean="0"/>
+                  <a:t>Assume SMCLK </a:t>
+                </a:r>
+                <a:r>
+                  <a:rPr lang="en-US" sz="2400" dirty="0"/>
+                  <a:t>= </a:t>
+                </a:r>
+                <a:r>
+                  <a:rPr lang="en-US" sz="2400" dirty="0" smtClean="0"/>
+                  <a:t>1 </a:t>
+                </a:r>
+                <a:r>
+                  <a:rPr lang="en-US" sz="2400" dirty="0"/>
+                  <a:t>MHz, </a:t>
+                </a:r>
+                <a:r>
+                  <a:rPr lang="en-US" sz="2400" dirty="0" smtClean="0"/>
+                  <a:t>TASSEL_2</a:t>
+                </a:r>
+                <a:r>
+                  <a:rPr lang="en-US" sz="2400" dirty="0"/>
+                  <a:t>, </a:t>
+                </a:r>
+                <a:r>
+                  <a:rPr lang="en-US" sz="2400" dirty="0" smtClean="0"/>
+                  <a:t>ID_2</a:t>
+                </a:r>
+                <a:r>
+                  <a:rPr lang="en-US" sz="2400" dirty="0"/>
+                  <a:t>, </a:t>
+                </a:r>
+                <a:r>
+                  <a:rPr lang="en-US" sz="2400" dirty="0" smtClean="0"/>
+                  <a:t>MC_1</a:t>
+                </a:r>
+                <a:r>
+                  <a:rPr lang="en-US" sz="2400" dirty="0"/>
+                  <a:t>, and TAR starts at 0</a:t>
+                </a:r>
+                <a:endParaRPr lang="en-US" sz="2400" dirty="0" smtClean="0"/>
+              </a:p>
+              <a:p>
+                <a:pPr marL="0" indent="0">
+                  <a:buNone/>
+                </a:pPr>
+                <a:endParaRPr lang="en-US" dirty="0" smtClean="0"/>
+              </a:p>
+              <a:p>
+                <a:pPr marL="0" indent="0">
+                  <a:buNone/>
+                </a:pPr>
+                <a:r>
+                  <a:rPr lang="en-US" dirty="0" smtClean="0"/>
+                  <a:t>	</a:t>
+                </a:r>
+                <a14:m>
+                  <m:oMath xmlns:m="http://schemas.openxmlformats.org/officeDocument/2006/math">
+                    <m:f>
+                      <m:fPr>
+                        <m:ctrlPr>
+                          <a:rPr lang="en-US" i="1">
+                            <a:latin typeface="Cambria Math"/>
+                          </a:rPr>
+                        </m:ctrlPr>
+                      </m:fPr>
+                      <m:num>
+                        <m:r>
+                          <a:rPr lang="en-US" i="1">
+                            <a:latin typeface="Cambria Math"/>
+                          </a:rPr>
+                          <m:t>_____ </m:t>
+                        </m:r>
+                        <m:r>
+                          <a:rPr lang="en-US" i="1">
+                            <a:latin typeface="Cambria Math"/>
+                          </a:rPr>
+                          <m:t>𝑐𝑙𝑘𝑠</m:t>
+                        </m:r>
+                      </m:num>
+                      <m:den>
+                        <m:r>
+                          <a:rPr lang="en-US" i="1">
+                            <a:latin typeface="Cambria Math"/>
+                          </a:rPr>
+                          <m:t>1</m:t>
+                        </m:r>
+                        <m:r>
+                          <a:rPr lang="en-US" b="0" i="1" smtClean="0">
+                            <a:latin typeface="Cambria Math"/>
+                          </a:rPr>
+                          <m:t>𝑥</m:t>
+                        </m:r>
+                        <m:sSup>
+                          <m:sSupPr>
+                            <m:ctrlPr>
+                              <a:rPr lang="en-US" b="0" i="1" smtClean="0">
+                                <a:latin typeface="Cambria Math"/>
+                              </a:rPr>
+                            </m:ctrlPr>
+                          </m:sSupPr>
+                          <m:e>
+                            <m:r>
+                              <a:rPr lang="en-US" b="0" i="1" smtClean="0">
+                                <a:latin typeface="Cambria Math"/>
+                              </a:rPr>
+                              <m:t>10</m:t>
+                            </m:r>
+                          </m:e>
+                          <m:sup>
+                            <m:r>
+                              <a:rPr lang="en-US" i="1">
+                                <a:latin typeface="Cambria Math"/>
+                              </a:rPr>
+                              <m:t>−6</m:t>
+                            </m:r>
+                          </m:sup>
+                        </m:sSup>
+                        <m:r>
+                          <a:rPr lang="en-US" i="1">
+                            <a:latin typeface="Cambria Math"/>
+                          </a:rPr>
+                          <m:t>𝑠</m:t>
+                        </m:r>
+                      </m:den>
+                    </m:f>
+                    <m:r>
+                      <a:rPr lang="en-US" i="1">
+                        <a:latin typeface="Cambria Math"/>
+                      </a:rPr>
+                      <m:t>×</m:t>
+                    </m:r>
+                    <m:f>
+                      <m:fPr>
+                        <m:ctrlPr>
+                          <a:rPr lang="en-US" i="1">
+                            <a:latin typeface="Cambria Math"/>
+                          </a:rPr>
+                        </m:ctrlPr>
+                      </m:fPr>
+                      <m:num>
+                        <m:r>
+                          <a:rPr lang="en-US" i="1">
+                            <a:latin typeface="Cambria Math"/>
+                          </a:rPr>
+                          <m:t>1 </m:t>
+                        </m:r>
+                        <m:r>
+                          <a:rPr lang="en-US" i="1">
+                            <a:latin typeface="Cambria Math"/>
+                          </a:rPr>
+                          <m:t>𝑐𝑛𝑡</m:t>
+                        </m:r>
+                      </m:num>
+                      <m:den>
+                        <m:r>
+                          <a:rPr lang="en-US" i="1">
+                            <a:latin typeface="Cambria Math"/>
+                          </a:rPr>
+                          <m:t>_____ </m:t>
+                        </m:r>
+                        <m:r>
+                          <a:rPr lang="en-US" i="1">
+                            <a:latin typeface="Cambria Math"/>
+                          </a:rPr>
+                          <m:t>𝑐𝑙𝑘𝑠</m:t>
+                        </m:r>
+                      </m:den>
+                    </m:f>
+                    <m:r>
+                      <a:rPr lang="en-US" i="1">
+                        <a:latin typeface="Cambria Math"/>
+                      </a:rPr>
+                      <m:t>×</m:t>
+                    </m:r>
+                    <m:f>
+                      <m:fPr>
+                        <m:ctrlPr>
+                          <a:rPr lang="en-US" i="1">
+                            <a:latin typeface="Cambria Math"/>
+                          </a:rPr>
+                        </m:ctrlPr>
+                      </m:fPr>
+                      <m:num>
+                        <m:r>
+                          <a:rPr lang="en-US" b="0" i="1" smtClean="0">
+                            <a:latin typeface="Cambria Math"/>
+                          </a:rPr>
+                          <m:t>16</m:t>
+                        </m:r>
+                        <m:r>
+                          <a:rPr lang="en-US" i="1">
+                            <a:latin typeface="Cambria Math"/>
+                          </a:rPr>
+                          <m:t> </m:t>
+                        </m:r>
+                        <m:r>
+                          <a:rPr lang="en-US" b="0" i="1" smtClean="0">
+                            <a:latin typeface="Cambria Math"/>
+                          </a:rPr>
+                          <m:t>𝑚</m:t>
+                        </m:r>
+                        <m:r>
+                          <a:rPr lang="en-US" i="1">
+                            <a:latin typeface="Cambria Math"/>
+                          </a:rPr>
+                          <m:t>𝑠</m:t>
+                        </m:r>
+                      </m:num>
+                      <m:den>
+                        <m:r>
+                          <a:rPr lang="en-US" i="1">
+                            <a:latin typeface="Cambria Math"/>
+                          </a:rPr>
+                          <m:t>1 </m:t>
+                        </m:r>
+                        <m:r>
+                          <a:rPr lang="en-US" i="1">
+                            <a:latin typeface="Cambria Math"/>
+                          </a:rPr>
+                          <m:t>𝑇𝐴𝑅</m:t>
+                        </m:r>
+                        <m:r>
+                          <a:rPr lang="en-US" i="1">
+                            <a:latin typeface="Cambria Math"/>
+                          </a:rPr>
+                          <m:t> </m:t>
+                        </m:r>
+                        <m:r>
+                          <a:rPr lang="en-US" i="1">
+                            <a:latin typeface="Cambria Math"/>
+                          </a:rPr>
+                          <m:t>𝑟𝑜𝑙𝑙</m:t>
+                        </m:r>
+                        <m:r>
+                          <a:rPr lang="en-US" i="1">
+                            <a:latin typeface="Cambria Math"/>
+                          </a:rPr>
+                          <m:t> </m:t>
+                        </m:r>
+                        <m:r>
+                          <a:rPr lang="en-US" i="1">
+                            <a:latin typeface="Cambria Math"/>
+                          </a:rPr>
+                          <m:t>𝑜𝑣𝑒𝑟</m:t>
+                        </m:r>
+                      </m:den>
+                    </m:f>
+                    <m:r>
+                      <a:rPr lang="en-US" i="1">
+                        <a:latin typeface="Cambria Math"/>
+                      </a:rPr>
+                      <m:t>=</m:t>
+                    </m:r>
+                  </m:oMath>
+                </a14:m>
+                <a:endParaRPr lang="en-US" dirty="0"/>
+              </a:p>
+              <a:p>
+                <a:pPr marL="0" indent="0">
+                  <a:buNone/>
+                </a:pPr>
+                <a:endParaRPr lang="en-US" dirty="0"/>
+              </a:p>
+            </p:txBody>
+          </p:sp>
+        </mc:Choice>
+        <mc:Fallback xmlns="">
+          <p:sp>
+            <p:nvSpPr>
+              <p:cNvPr id="3" name="Content Placeholder 2"/>
+              <p:cNvSpPr>
+                <a:spLocks noGrp="1" noRot="1" noChangeAspect="1" noMove="1" noResize="1" noEditPoints="1" noAdjustHandles="1" noChangeArrowheads="1" noChangeShapeType="1" noTextEdit="1"/>
+              </p:cNvSpPr>
+              <p:nvPr>
+                <p:ph idx="1"/>
+              </p:nvPr>
+            </p:nvSpPr>
+            <p:spPr>
+              <a:blipFill rotWithShape="1">
+                <a:blip r:embed="rId2"/>
+                <a:stretch>
+                  <a:fillRect l="-1804" t="-1806" r="-1098"/>
+                </a:stretch>
+              </a:blipFill>
+            </p:spPr>
+            <p:txBody>
+              <a:bodyPr/>
+              <a:lstStyle/>
+              <a:p>
+                <a:r>
+                  <a:rPr lang="en-US">
+                    <a:noFill/>
+                  </a:rPr>
+                  <a:t> </a:t>
+                </a:r>
+              </a:p>
+            </p:txBody>
+          </p:sp>
+        </mc:Fallback>
+      </mc:AlternateContent>
+    </p:spTree>
+    <p:extLst>
+      <p:ext uri="{BB962C8B-B14F-4D97-AF65-F5344CB8AC3E}">
+        <p14:creationId xmlns:p14="http://schemas.microsoft.com/office/powerpoint/2010/main" val="2086132802"/>
+      </p:ext>
+    </p:extLst>
+  </p:cSld>
+  <p:clrMapOvr>
+    <a:masterClrMapping/>
+  </p:clrMapOvr>
+  <p:timing>
+    <p:tnLst>
+      <p:par>
+        <p:cTn id="1" dur="indefinite" restart="never" nodeType="tmRoot"/>
+      </p:par>
+    </p:tnLst>
+  </p:timing>
+</p:sld>
+</file>
+
+<file path=ppt/slides/slide19.xml><?xml version="1.0" encoding="utf-8"?>
+<p:sld xmlns:a="http://schemas.openxmlformats.org/drawingml/2006/main" xmlns:r="http://schemas.openxmlformats.org/officeDocument/2006/relationships" xmlns:p="http://schemas.openxmlformats.org/presentationml/2006/main">
+  <p:cSld>
+    <p:spTree>
+      <p:nvGrpSpPr>
+        <p:cNvPr id="1" name=""/>
+        <p:cNvGrpSpPr/>
+        <p:nvPr/>
+      </p:nvGrpSpPr>
+      <p:grpSpPr>
+        <a:xfrm>
+          <a:off x="0" y="0"/>
+          <a:ext cx="0" cy="0"/>
+          <a:chOff x="0" y="0"/>
+          <a:chExt cx="0" cy="0"/>
+        </a:xfrm>
+      </p:grpSpPr>
+      <p:sp>
+        <p:nvSpPr>
+          <p:cNvPr id="2" name="Title 1"/>
+          <p:cNvSpPr>
+            <a:spLocks noGrp="1"/>
+          </p:cNvSpPr>
+          <p:nvPr>
+            <p:ph type="title"/>
+          </p:nvPr>
+        </p:nvSpPr>
+        <p:spPr/>
+        <p:txBody>
+          <a:bodyPr/>
+          <a:lstStyle/>
+          <a:p>
+            <a:r>
               <a:rPr lang="en-US" b="1" dirty="0" smtClean="0"/>
               <a:t>Example Timer Interrupt </a:t>
             </a:r>
             <a:r>
               <a:rPr lang="en-US" sz="2000" b="1" dirty="0" smtClean="0"/>
-              <a:t>(see </a:t>
-            </a:r>
-            <a:r>
-              <a:rPr lang="en-US" sz="2000" b="1" dirty="0" smtClean="0"/>
-              <a:t>lec26.c</a:t>
-            </a:r>
-            <a:r>
-              <a:rPr lang="en-US" sz="2000" b="1" dirty="0" smtClean="0"/>
-              <a:t>)</a:t>
+              <a:t>(see lec26.c)</a:t>
             </a:r>
             <a:endParaRPr lang="en-US" sz="2000" b="1" dirty="0"/>
           </a:p>
@@ -12203,6 +12579,18 @@
             <a:pPr marL="57150" indent="0">
               <a:buNone/>
             </a:pPr>
+            <a:endParaRPr lang="en-US" sz="1400" b="1" dirty="0">
+              <a:solidFill>
+                <a:schemeClr val="accent2"/>
+              </a:solidFill>
+              <a:latin typeface="Courier New" pitchFamily="49" charset="0"/>
+              <a:cs typeface="Courier New" pitchFamily="49" charset="0"/>
+            </a:endParaRPr>
+          </a:p>
+          <a:p>
+            <a:pPr marL="57150" indent="0">
+              <a:buNone/>
+            </a:pPr>
             <a:r>
               <a:rPr lang="en-US" sz="1400" b="1" dirty="0" smtClean="0">
                 <a:solidFill>
@@ -12386,7 +12774,27 @@
                 <a:latin typeface="Courier New" pitchFamily="49" charset="0"/>
                 <a:cs typeface="Courier New" pitchFamily="49" charset="0"/>
               </a:rPr>
-              <a:t>= ID_3 | TASSEL_2 | MC_1 | TAIE;		</a:t>
+              <a:t>= </a:t>
+            </a:r>
+            <a:r>
+              <a:rPr lang="en-US" sz="1400" b="1" dirty="0" smtClean="0">
+                <a:solidFill>
+                  <a:schemeClr val="accent2"/>
+                </a:solidFill>
+                <a:latin typeface="Courier New" pitchFamily="49" charset="0"/>
+                <a:cs typeface="Courier New" pitchFamily="49" charset="0"/>
+              </a:rPr>
+              <a:t>ID_2 </a:t>
+            </a:r>
+            <a:r>
+              <a:rPr lang="en-US" sz="1400" b="1" dirty="0">
+                <a:solidFill>
+                  <a:schemeClr val="accent2"/>
+                </a:solidFill>
+                <a:latin typeface="Courier New" pitchFamily="49" charset="0"/>
+                <a:cs typeface="Courier New" pitchFamily="49" charset="0"/>
+              </a:rPr>
+              <a:t>| TASSEL_2 | MC_1 | TAIE;		</a:t>
             </a:r>
             <a:endParaRPr lang="en-US" sz="1400" b="1" dirty="0" smtClean="0">
               <a:solidFill>
@@ -12879,7 +13287,114 @@
 </p:sld>
 </file>
 
-<file path=ppt/slides/slide19.xml><?xml version="1.0" encoding="utf-8"?>
+<file path=ppt/slides/slide2.xml><?xml version="1.0" encoding="utf-8"?>
+<p:sld xmlns:a="http://schemas.openxmlformats.org/drawingml/2006/main" xmlns:r="http://schemas.openxmlformats.org/officeDocument/2006/relationships" xmlns:p="http://schemas.openxmlformats.org/presentationml/2006/main">
+  <p:cSld>
+    <p:spTree>
+      <p:nvGrpSpPr>
+        <p:cNvPr id="1" name=""/>
+        <p:cNvGrpSpPr/>
+        <p:nvPr/>
+      </p:nvGrpSpPr>
+      <p:grpSpPr>
+        <a:xfrm>
+          <a:off x="0" y="0"/>
+          <a:ext cx="0" cy="0"/>
+          <a:chOff x="0" y="0"/>
+          <a:chExt cx="0" cy="0"/>
+        </a:xfrm>
+      </p:grpSpPr>
+      <p:sp>
+        <p:nvSpPr>
+          <p:cNvPr id="2" name="Title 1"/>
+          <p:cNvSpPr>
+            <a:spLocks noGrp="1"/>
+          </p:cNvSpPr>
+          <p:nvPr>
+            <p:ph type="title"/>
+          </p:nvPr>
+        </p:nvSpPr>
+        <p:spPr/>
+        <p:txBody>
+          <a:bodyPr/>
+          <a:lstStyle/>
+          <a:p>
+            <a:r>
+              <a:rPr lang="en-US" b="1" dirty="0" smtClean="0"/>
+              <a:t>Interrupts</a:t>
+            </a:r>
+            <a:endParaRPr lang="en-US" b="1" dirty="0"/>
+          </a:p>
+        </p:txBody>
+      </p:sp>
+      <p:sp>
+        <p:nvSpPr>
+          <p:cNvPr id="3" name="Content Placeholder 2"/>
+          <p:cNvSpPr>
+            <a:spLocks noGrp="1"/>
+          </p:cNvSpPr>
+          <p:nvPr>
+            <p:ph idx="1"/>
+          </p:nvPr>
+        </p:nvSpPr>
+        <p:spPr>
+          <a:xfrm>
+            <a:off x="348339" y="847679"/>
+            <a:ext cx="8083562" cy="5747330"/>
+          </a:xfrm>
+        </p:spPr>
+        <p:txBody>
+          <a:bodyPr/>
+          <a:lstStyle/>
+          <a:p>
+            <a:pPr marL="0" indent="0">
+              <a:buNone/>
+            </a:pPr>
+            <a:r>
+              <a:rPr lang="en-US" sz="2000" dirty="0" smtClean="0"/>
+              <a:t>What is an interrupt?</a:t>
+            </a:r>
+          </a:p>
+          <a:p>
+            <a:pPr marL="0" indent="0">
+              <a:buNone/>
+            </a:pPr>
+            <a:r>
+              <a:rPr lang="en-US" sz="2000" dirty="0" smtClean="0"/>
+              <a:t>Why is it better than polling?</a:t>
+            </a:r>
+          </a:p>
+          <a:p>
+            <a:pPr lvl="1"/>
+            <a:endParaRPr lang="en-US" sz="1600" dirty="0" smtClean="0">
+              <a:solidFill>
+                <a:schemeClr val="accent2"/>
+              </a:solidFill>
+            </a:endParaRPr>
+          </a:p>
+        </p:txBody>
+      </p:sp>
+    </p:spTree>
+    <p:extLst>
+      <p:ext uri="{BB962C8B-B14F-4D97-AF65-F5344CB8AC3E}">
+        <p14:creationId xmlns:p14="http://schemas.microsoft.com/office/powerpoint/2010/main" val="333513743"/>
+      </p:ext>
+    </p:extLst>
+  </p:cSld>
+  <p:clrMapOvr>
+    <a:masterClrMapping/>
+  </p:clrMapOvr>
+  <p:timing>
+    <p:tnLst>
+      <p:par>
+        <p:cTn id="1" dur="indefinite" restart="never" nodeType="tmRoot"/>
+      </p:par>
+    </p:tnLst>
+  </p:timing>
+</p:sld>
+</file>
+
+<file path=ppt/slides/slide20.xml><?xml version="1.0" encoding="utf-8"?>
 <p:sld xmlns:a="http://schemas.openxmlformats.org/drawingml/2006/main" xmlns:r="http://schemas.openxmlformats.org/officeDocument/2006/relationships" xmlns:p="http://schemas.openxmlformats.org/presentationml/2006/main">
   <p:cSld>
     <p:spTree>
@@ -13577,113 +14092,6 @@
 </p:sld>
 </file>
 
-<file path=ppt/slides/slide2.xml><?xml version="1.0" encoding="utf-8"?>
-<p:sld xmlns:a="http://schemas.openxmlformats.org/drawingml/2006/main" xmlns:r="http://schemas.openxmlformats.org/officeDocument/2006/relationships" xmlns:p="http://schemas.openxmlformats.org/presentationml/2006/main">
-  <p:cSld>
-    <p:spTree>
-      <p:nvGrpSpPr>
-        <p:cNvPr id="1" name=""/>
-        <p:cNvGrpSpPr/>
-        <p:nvPr/>
-      </p:nvGrpSpPr>
-      <p:grpSpPr>
-        <a:xfrm>
-          <a:off x="0" y="0"/>
-          <a:ext cx="0" cy="0"/>
-          <a:chOff x="0" y="0"/>
-          <a:chExt cx="0" cy="0"/>
-        </a:xfrm>
-      </p:grpSpPr>
-      <p:sp>
-        <p:nvSpPr>
-          <p:cNvPr id="2" name="Title 1"/>
-          <p:cNvSpPr>
-            <a:spLocks noGrp="1"/>
-          </p:cNvSpPr>
-          <p:nvPr>
-            <p:ph type="title"/>
-          </p:nvPr>
-        </p:nvSpPr>
-        <p:spPr/>
-        <p:txBody>
-          <a:bodyPr/>
-          <a:lstStyle/>
-          <a:p>
-            <a:r>
-              <a:rPr lang="en-US" b="1" dirty="0" smtClean="0"/>
-              <a:t>Interrupts</a:t>
-            </a:r>
-            <a:endParaRPr lang="en-US" b="1" dirty="0"/>
-          </a:p>
-        </p:txBody>
-      </p:sp>
-      <p:sp>
-        <p:nvSpPr>
-          <p:cNvPr id="3" name="Content Placeholder 2"/>
-          <p:cNvSpPr>
-            <a:spLocks noGrp="1"/>
-          </p:cNvSpPr>
-          <p:nvPr>
-            <p:ph idx="1"/>
-          </p:nvPr>
-        </p:nvSpPr>
-        <p:spPr>
-          <a:xfrm>
-            <a:off x="348339" y="847679"/>
-            <a:ext cx="8083562" cy="5747330"/>
-          </a:xfrm>
-        </p:spPr>
-        <p:txBody>
-          <a:bodyPr/>
-          <a:lstStyle/>
-          <a:p>
-            <a:pPr marL="0" indent="0">
-              <a:buNone/>
-            </a:pPr>
-            <a:r>
-              <a:rPr lang="en-US" sz="2000" dirty="0" smtClean="0"/>
-              <a:t>What is an interrupt?</a:t>
-            </a:r>
-          </a:p>
-          <a:p>
-            <a:pPr marL="0" indent="0">
-              <a:buNone/>
-            </a:pPr>
-            <a:r>
-              <a:rPr lang="en-US" sz="2000" dirty="0" smtClean="0"/>
-              <a:t>Why is it better than polling?</a:t>
-            </a:r>
-          </a:p>
-          <a:p>
-            <a:pPr lvl="1"/>
-            <a:endParaRPr lang="en-US" sz="1600" dirty="0" smtClean="0">
-              <a:solidFill>
-                <a:schemeClr val="accent2"/>
-              </a:solidFill>
-            </a:endParaRPr>
-          </a:p>
-        </p:txBody>
-      </p:sp>
-    </p:spTree>
-    <p:extLst>
-      <p:ext uri="{BB962C8B-B14F-4D97-AF65-F5344CB8AC3E}">
-        <p14:creationId xmlns:p14="http://schemas.microsoft.com/office/powerpoint/2010/main" val="333513743"/>
-      </p:ext>
-    </p:extLst>
-  </p:cSld>
-  <p:clrMapOvr>
-    <a:masterClrMapping/>
-  </p:clrMapOvr>
-  <p:timing>
-    <p:tnLst>
-      <p:par>
-        <p:cTn id="1" dur="indefinite" restart="never" nodeType="tmRoot"/>
-      </p:par>
-    </p:tnLst>
-  </p:timing>
-</p:sld>
-</file>
-
 <file path=ppt/slides/slide3.xml><?xml version="1.0" encoding="utf-8"?>
 <p:sld xmlns:a="http://schemas.openxmlformats.org/drawingml/2006/main" xmlns:r="http://schemas.openxmlformats.org/officeDocument/2006/relationships" xmlns:p="http://schemas.openxmlformats.org/presentationml/2006/main">
   <p:cSld>
@@ -13718,11 +14126,7 @@
           <a:p>
             <a:r>
               <a:rPr lang="en-US" b="1" dirty="0" smtClean="0"/>
-              <a:t>Lesson 25 Polling - Example </a:t>
-            </a:r>
-            <a:r>
-              <a:rPr lang="en-US" b="1" dirty="0" smtClean="0"/>
-              <a:t>Code</a:t>
+              <a:t>Lesson 25 Polling - Example Code</a:t>
             </a:r>
             <a:endParaRPr lang="en-US" b="1" dirty="0"/>
           </a:p>
@@ -14029,8 +14433,23 @@
                 </a:solidFill>
                 <a:latin typeface="Consolas"/>
               </a:rPr>
-              <a:t>// Set SMCLK 8 MHz</a:t>
-            </a:r>
+              <a:t>// Set SMCLK 8 </a:t>
+            </a:r>
+            <a:r>
+              <a:rPr lang="en-US" sz="1200" dirty="0" smtClean="0">
+                <a:solidFill>
+                  <a:srgbClr val="3F7F5F"/>
+                </a:solidFill>
+                <a:latin typeface="Consolas"/>
+              </a:rPr>
+              <a:t>MHz</a:t>
+            </a:r>
+            <a:endParaRPr lang="en-US" sz="1200" dirty="0">
+              <a:solidFill>
+                <a:srgbClr val="3F7F5F"/>
+              </a:solidFill>
+              <a:latin typeface="Consolas"/>
+            </a:endParaRPr>
           </a:p>
           <a:p>
             <a:pPr marL="0" indent="0">
@@ -14043,13 +14462,72 @@
                 </a:solidFill>
                 <a:latin typeface="Consolas"/>
               </a:rPr>
-              <a:t>    DCOCTL = CALDCO_8MHZ;</a:t>
-            </a:r>
+              <a:t>    DCOCTL = CALDCO_8MHZ</a:t>
+            </a:r>
+            <a:r>
+              <a:rPr lang="en-US" sz="1200" dirty="0" smtClean="0">
+                <a:solidFill>
+                  <a:srgbClr val="000000"/>
+                </a:solidFill>
+                <a:latin typeface="Consolas"/>
+              </a:rPr>
+              <a:t>;</a:t>
+            </a:r>
+            <a:endParaRPr lang="en-US" sz="1200" dirty="0">
+              <a:solidFill>
+                <a:srgbClr val="000000"/>
+              </a:solidFill>
+              <a:latin typeface="Consolas"/>
+            </a:endParaRPr>
           </a:p>
           <a:p>
             <a:pPr marL="0" indent="0">
               <a:buNone/>
             </a:pPr>
+            <a:endParaRPr lang="en-US" sz="1200" dirty="0" smtClean="0">
+              <a:latin typeface="Consolas"/>
+            </a:endParaRPr>
+          </a:p>
+          <a:p>
+            <a:pPr marL="0" indent="0">
+              <a:buNone/>
+            </a:pPr>
+            <a:r>
+              <a:rPr lang="en-US" sz="1200" dirty="0" smtClean="0">
+                <a:latin typeface="Consolas"/>
+              </a:rPr>
+              <a:t>    P1DIR </a:t>
+            </a:r>
+            <a:r>
+              <a:rPr lang="en-US" sz="1200" dirty="0">
+                <a:latin typeface="Consolas"/>
+              </a:rPr>
+              <a:t>= BIT6; </a:t>
+            </a:r>
+            <a:r>
+              <a:rPr lang="en-US" sz="1200" dirty="0" smtClean="0">
+                <a:latin typeface="Consolas"/>
+              </a:rPr>
+              <a:t>		</a:t>
+            </a:r>
+            <a:r>
+              <a:rPr lang="en-US" sz="1200" dirty="0" smtClean="0">
+                <a:solidFill>
+                  <a:srgbClr val="3F7F5F"/>
+                </a:solidFill>
+                <a:latin typeface="Consolas"/>
+              </a:rPr>
+              <a:t>// </a:t>
+            </a:r>
+            <a:r>
+              <a:rPr lang="en-US" sz="1200" dirty="0">
+                <a:solidFill>
+                  <a:srgbClr val="3F7F5F"/>
+                </a:solidFill>
+                <a:latin typeface="Consolas"/>
+              </a:rPr>
+              <a:t>Set the green LED as an output</a:t>
+            </a:r>
             <a:endParaRPr lang="en-US" sz="1200" dirty="0">
               <a:latin typeface="Consolas"/>
             </a:endParaRPr>
@@ -14059,139 +14537,86 @@
               <a:buNone/>
             </a:pPr>
             <a:r>
+              <a:rPr lang="en-US" sz="1200" dirty="0" smtClean="0">
+                <a:solidFill>
+                  <a:srgbClr val="000000"/>
+                </a:solidFill>
+                <a:latin typeface="Consolas"/>
+              </a:rPr>
+              <a:t>    </a:t>
+            </a:r>
+          </a:p>
+          <a:p>
+            <a:pPr marL="0" indent="0">
+              <a:buNone/>
+            </a:pPr>
+            <a:r>
               <a:rPr lang="en-US" sz="1200" dirty="0">
                 <a:solidFill>
                   <a:srgbClr val="000000"/>
                 </a:solidFill>
                 <a:latin typeface="Consolas"/>
               </a:rPr>
+              <a:t> </a:t>
+            </a:r>
+            <a:r>
+              <a:rPr lang="en-US" sz="1200" dirty="0" smtClean="0">
+                <a:solidFill>
+                  <a:srgbClr val="000000"/>
+                </a:solidFill>
+                <a:latin typeface="Consolas"/>
+              </a:rPr>
+              <a:t>   TACCR0 </a:t>
+            </a:r>
+            <a:r>
+              <a:rPr lang="en-US" sz="1200" dirty="0">
+                <a:solidFill>
+                  <a:srgbClr val="000000"/>
+                </a:solidFill>
+                <a:latin typeface="Consolas"/>
+              </a:rPr>
+              <a:t>= 256 - 1;                    </a:t>
+            </a:r>
+            <a:r>
+              <a:rPr lang="en-US" sz="1200" dirty="0">
+                <a:solidFill>
+                  <a:srgbClr val="3F7F5F"/>
+                </a:solidFill>
+                <a:latin typeface="Consolas"/>
+              </a:rPr>
+              <a:t>// Set the interval</a:t>
+            </a:r>
+          </a:p>
+          <a:p>
+            <a:pPr marL="0" indent="0">
+              <a:buNone/>
+            </a:pPr>
+            <a:r>
+              <a:rPr lang="en-US" sz="1200" dirty="0">
+                <a:solidFill>
+                  <a:srgbClr val="000000"/>
+                </a:solidFill>
+                <a:latin typeface="Consolas"/>
+              </a:rPr>
               <a:t>    </a:t>
             </a:r>
             <a:r>
+              <a:rPr lang="en-US" sz="1200" dirty="0" smtClean="0">
+                <a:solidFill>
+                  <a:srgbClr val="000000"/>
+                </a:solidFill>
+                <a:latin typeface="Consolas"/>
+              </a:rPr>
+              <a:t>TA0CTL </a:t>
+            </a:r>
+            <a:r>
               <a:rPr lang="en-US" sz="1200" dirty="0">
                 <a:solidFill>
                   <a:srgbClr val="000000"/>
                 </a:solidFill>
-                <a:highlight>
-                  <a:srgbClr val="F0D8A8"/>
-                </a:highlight>
-                <a:latin typeface="Consolas"/>
-              </a:rPr>
-              <a:t>P1DIR = BIT6</a:t>
-            </a:r>
-            <a:r>
-              <a:rPr lang="en-US" sz="1200" dirty="0" smtClean="0">
-                <a:solidFill>
-                  <a:srgbClr val="000000"/>
-                </a:solidFill>
-                <a:highlight>
-                  <a:srgbClr val="F0D8A8"/>
-                </a:highlight>
-                <a:latin typeface="Consolas"/>
-              </a:rPr>
-              <a:t>;               </a:t>
-            </a:r>
-            <a:r>
-              <a:rPr lang="en-US" sz="1200" dirty="0" smtClean="0">
-                <a:solidFill>
-                  <a:srgbClr val="3F7F5F"/>
-                </a:solidFill>
-                <a:highlight>
-                  <a:srgbClr val="F0D8A8"/>
-                </a:highlight>
-                <a:latin typeface="Consolas"/>
-              </a:rPr>
-              <a:t>// </a:t>
-            </a:r>
-            <a:r>
-              <a:rPr lang="en-US" sz="1200" dirty="0">
-                <a:solidFill>
-                  <a:srgbClr val="3F7F5F"/>
-                </a:solidFill>
-                <a:highlight>
-                  <a:srgbClr val="F0D8A8"/>
-                </a:highlight>
-                <a:latin typeface="Consolas"/>
-              </a:rPr>
-              <a:t>Set the green LED as an output</a:t>
-            </a:r>
-          </a:p>
-          <a:p>
-            <a:pPr marL="0" indent="0">
-              <a:buNone/>
-            </a:pPr>
-            <a:r>
-              <a:rPr lang="en-US" sz="1200" dirty="0">
-                <a:solidFill>
-                  <a:srgbClr val="000000"/>
-                </a:solidFill>
-                <a:latin typeface="Consolas"/>
-              </a:rPr>
-              <a:t> </a:t>
-            </a:r>
-            <a:r>
-              <a:rPr lang="en-US" sz="1200" dirty="0" smtClean="0">
-                <a:solidFill>
-                  <a:srgbClr val="000000"/>
-                </a:solidFill>
-                <a:latin typeface="Consolas"/>
-              </a:rPr>
-              <a:t>   </a:t>
-            </a:r>
-          </a:p>
-          <a:p>
-            <a:pPr marL="0" indent="0">
-              <a:buNone/>
-            </a:pPr>
-            <a:r>
-              <a:rPr lang="en-US" sz="1200" dirty="0">
-                <a:solidFill>
-                  <a:srgbClr val="000000"/>
-                </a:solidFill>
-                <a:latin typeface="Consolas"/>
-              </a:rPr>
-              <a:t> </a:t>
-            </a:r>
-            <a:r>
-              <a:rPr lang="en-US" sz="1200" dirty="0" smtClean="0">
-                <a:solidFill>
-                  <a:srgbClr val="000000"/>
-                </a:solidFill>
-                <a:latin typeface="Consolas"/>
-              </a:rPr>
-              <a:t>   TACCR0 </a:t>
-            </a:r>
-            <a:r>
-              <a:rPr lang="en-US" sz="1200" dirty="0">
-                <a:solidFill>
-                  <a:srgbClr val="000000"/>
-                </a:solidFill>
-                <a:latin typeface="Consolas"/>
-              </a:rPr>
-              <a:t>= 256 - 1;                    </a:t>
-            </a:r>
-            <a:r>
-              <a:rPr lang="en-US" sz="1200" dirty="0">
-                <a:solidFill>
-                  <a:srgbClr val="3F7F5F"/>
-                </a:solidFill>
-                <a:latin typeface="Consolas"/>
-              </a:rPr>
-              <a:t>// Set the interval</a:t>
-            </a:r>
-          </a:p>
-          <a:p>
-            <a:pPr marL="0" indent="0">
-              <a:buNone/>
-            </a:pPr>
-            <a:r>
-              <a:rPr lang="en-US" sz="1200" dirty="0">
-                <a:solidFill>
-                  <a:srgbClr val="000000"/>
-                </a:solidFill>
-                <a:latin typeface="Consolas"/>
-              </a:rPr>
-              <a:t>    TACTL &amp;= ~TAIFG;                     </a:t>
+                <a:latin typeface="Consolas"/>
+              </a:rPr>
+              <a:t>&amp;= ~TAIFG;                     </a:t>
             </a:r>
             <a:r>
               <a:rPr lang="en-US" sz="1200" dirty="0">
@@ -14217,7 +14642,25 @@
                 </a:solidFill>
                 <a:latin typeface="Consolas"/>
               </a:rPr>
-              <a:t>    TACTL |= ID_0 | TASSEL_2 | MC_1</a:t>
+              <a:t>    </a:t>
+            </a:r>
+            <a:r>
+              <a:rPr lang="en-US" sz="1200" dirty="0" smtClean="0">
+                <a:solidFill>
+                  <a:srgbClr val="000000"/>
+                </a:solidFill>
+                <a:latin typeface="Consolas"/>
+              </a:rPr>
+              <a:t>TA0CTL </a:t>
+            </a:r>
+            <a:r>
+              <a:rPr lang="en-US" sz="1200" dirty="0">
+                <a:solidFill>
+                  <a:srgbClr val="000000"/>
+                </a:solidFill>
+                <a:latin typeface="Consolas"/>
+              </a:rPr>
+              <a:t>|= ID_0 | TASSEL_2 | MC_1</a:t>
             </a:r>
             <a:r>
               <a:rPr lang="en-US" sz="1200" dirty="0" smtClean="0">
@@ -14328,7 +14771,25 @@
                 </a:solidFill>
                 <a:latin typeface="Consolas"/>
               </a:rPr>
-              <a:t> ((TACTL &amp; TAIFG) == 0</a:t>
+              <a:t> ((</a:t>
+            </a:r>
+            <a:r>
+              <a:rPr lang="en-US" sz="1200" b="1" dirty="0" smtClean="0">
+                <a:solidFill>
+                  <a:srgbClr val="000000"/>
+                </a:solidFill>
+                <a:latin typeface="Consolas"/>
+              </a:rPr>
+              <a:t>TA0CTL </a:t>
+            </a:r>
+            <a:r>
+              <a:rPr lang="en-US" sz="1200" b="1" dirty="0">
+                <a:solidFill>
+                  <a:srgbClr val="000000"/>
+                </a:solidFill>
+                <a:latin typeface="Consolas"/>
+              </a:rPr>
+              <a:t>&amp; TAIFG) == 0</a:t>
             </a:r>
             <a:r>
               <a:rPr lang="en-US" sz="1200" b="1" dirty="0" smtClean="0">
@@ -14384,7 +14845,25 @@
                 </a:solidFill>
                 <a:latin typeface="Consolas"/>
               </a:rPr>
-              <a:t>    TACTL &amp;= ~TAIFG</a:t>
+              <a:t>    </a:t>
+            </a:r>
+            <a:r>
+              <a:rPr lang="en-US" sz="1200" dirty="0" smtClean="0">
+                <a:solidFill>
+                  <a:srgbClr val="000000"/>
+                </a:solidFill>
+                <a:latin typeface="Consolas"/>
+              </a:rPr>
+              <a:t>TA0CTL </a:t>
+            </a:r>
+            <a:r>
+              <a:rPr lang="en-US" sz="1200" dirty="0">
+                <a:solidFill>
+                  <a:srgbClr val="000000"/>
+                </a:solidFill>
+                <a:latin typeface="Consolas"/>
+              </a:rPr>
+              <a:t>&amp;= ~TAIFG</a:t>
             </a:r>
             <a:r>
               <a:rPr lang="en-US" sz="1200" dirty="0" smtClean="0">
@@ -14575,11 +15054,7 @@
           <a:p>
             <a:r>
               <a:rPr lang="en-US" b="1" dirty="0" smtClean="0"/>
-              <a:t>Lesson 25 Interrupt - Example </a:t>
-            </a:r>
-            <a:r>
-              <a:rPr lang="en-US" b="1" dirty="0" smtClean="0"/>
-              <a:t>Code</a:t>
+              <a:t>Lesson 25 Interrupt - Example Code</a:t>
             </a:r>
             <a:endParaRPr lang="en-US" b="1" dirty="0"/>
           </a:p>
@@ -14845,7 +15320,7 @@
                 </a:solidFill>
                 <a:latin typeface="Consolas"/>
               </a:rPr>
-              <a:t>    TACTL &amp;= ~(MC1|MC0);        </a:t>
+              <a:t>    TA0CTL &amp;= ~(MC1|MC0);        </a:t>
             </a:r>
             <a:r>
               <a:rPr lang="en-US" sz="1200" dirty="0" smtClean="0">
@@ -14871,7 +15346,7 @@
                 </a:solidFill>
                 <a:latin typeface="Consolas"/>
               </a:rPr>
-              <a:t>    </a:t>
+              <a:t>    TA0CTL </a:t>
             </a:r>
             <a:r>
               <a:rPr lang="en-US" sz="1200" dirty="0">
@@ -14880,7 +15355,7 @@
                 </a:solidFill>
                 <a:latin typeface="Consolas"/>
               </a:rPr>
-              <a:t>TACTL |= TACLR;             </a:t>
+              <a:t>|= TACLR;             </a:t>
             </a:r>
             <a:r>
               <a:rPr lang="en-US" sz="1200" dirty="0">
@@ -14903,7 +15378,7 @@
                 </a:solidFill>
                 <a:latin typeface="Consolas"/>
               </a:rPr>
-              <a:t>    </a:t>
+              <a:t>    TA0CTL </a:t>
             </a:r>
             <a:r>
               <a:rPr lang="en-US" sz="1200" dirty="0">
@@ -14912,7 +15387,7 @@
                 </a:solidFill>
                 <a:latin typeface="Consolas"/>
               </a:rPr>
-              <a:t>TACTL |= TASSEL1;           </a:t>
+              <a:t>|= TASSEL1;           </a:t>
             </a:r>
             <a:r>
               <a:rPr lang="en-US" sz="1200" dirty="0">
@@ -14938,7 +15413,7 @@
                 </a:solidFill>
                 <a:latin typeface="Consolas"/>
               </a:rPr>
-              <a:t>    </a:t>
+              <a:t>    TA0CTL </a:t>
             </a:r>
             <a:r>
               <a:rPr lang="en-US" sz="1200" dirty="0">
@@ -14947,7 +15422,7 @@
                 </a:solidFill>
                 <a:latin typeface="Consolas"/>
               </a:rPr>
-              <a:t>TACTL |= ID1|ID0;           </a:t>
+              <a:t>|= ID1|ID0;           </a:t>
             </a:r>
             <a:r>
               <a:rPr lang="en-US" sz="1200" dirty="0">
@@ -14973,7 +15448,7 @@
                 </a:solidFill>
                 <a:latin typeface="Consolas"/>
               </a:rPr>
-              <a:t>    </a:t>
+              <a:t>    TA0CTL </a:t>
             </a:r>
             <a:r>
               <a:rPr lang="en-US" sz="1200" dirty="0">
@@ -14982,7 +15457,7 @@
                 </a:solidFill>
                 <a:latin typeface="Consolas"/>
               </a:rPr>
-              <a:t>TACTL &amp;= ~TAIFG;            </a:t>
+              <a:t>&amp;= ~TAIFG;            </a:t>
             </a:r>
             <a:r>
               <a:rPr lang="en-US" sz="1200" dirty="0">
@@ -15008,7 +15483,7 @@
                 </a:solidFill>
                 <a:latin typeface="Consolas"/>
               </a:rPr>
-              <a:t>    </a:t>
+              <a:t>    TA0CTL </a:t>
             </a:r>
             <a:r>
               <a:rPr lang="en-US" sz="1200" dirty="0">
@@ -15017,7 +15492,7 @@
                 </a:solidFill>
                 <a:latin typeface="Consolas"/>
               </a:rPr>
-              <a:t>TACTL |= MC1;               </a:t>
+              <a:t>|= MC1;               </a:t>
             </a:r>
             <a:r>
               <a:rPr lang="en-US" sz="1200" dirty="0">
@@ -15043,7 +15518,7 @@
                 </a:solidFill>
                 <a:latin typeface="Consolas"/>
               </a:rPr>
-              <a:t>    </a:t>
+              <a:t>    TA0CTL </a:t>
             </a:r>
             <a:r>
               <a:rPr lang="en-US" sz="1200" dirty="0">
@@ -15052,7 +15527,7 @@
                 </a:solidFill>
                 <a:latin typeface="Consolas"/>
               </a:rPr>
-              <a:t>TACTL |= TAIE;              </a:t>
+              <a:t>|= TAIE;              </a:t>
             </a:r>
             <a:r>
               <a:rPr lang="en-US" sz="1200" dirty="0">
@@ -15768,7 +16243,25 @@
                 </a:solidFill>
                 <a:latin typeface="Consolas"/>
               </a:rPr>
-              <a:t>    TACTL &amp;= ~TAIFG;            </a:t>
+              <a:t>    </a:t>
+            </a:r>
+            <a:r>
+              <a:rPr lang="en-US" sz="1200" dirty="0" smtClean="0">
+                <a:solidFill>
+                  <a:srgbClr val="000000"/>
+                </a:solidFill>
+                <a:latin typeface="Consolas"/>
+              </a:rPr>
+              <a:t>TA0CTL </a:t>
+            </a:r>
+            <a:r>
+              <a:rPr lang="en-US" sz="1200" dirty="0">
+                <a:solidFill>
+                  <a:srgbClr val="000000"/>
+                </a:solidFill>
+                <a:latin typeface="Consolas"/>
+              </a:rPr>
+              <a:t>&amp;= ~TAIFG;            </a:t>
             </a:r>
             <a:r>
               <a:rPr lang="en-US" sz="1200" dirty="0">
@@ -15813,12 +16306,6 @@
               </a:rPr>
               <a:t>}</a:t>
             </a:r>
-            <a:endParaRPr lang="en-US" sz="1200" dirty="0">
-              <a:solidFill>
-                <a:srgbClr val="000000"/>
-              </a:solidFill>
-              <a:latin typeface="Consolas"/>
-            </a:endParaRPr>
           </a:p>
         </p:txBody>
       </p:sp>

</xml_diff>

<commit_message>
Updating last two slides on Lesson 26 to match the lesson 26 practice code.
</commit_message>
<xml_diff>
--- a/notes/L26/Lsn26.pptx
+++ b/notes/L26/Lsn26.pptx
@@ -11892,7 +11892,7 @@
                 </a:solidFill>
                 <a:latin typeface="Consolas"/>
               </a:rPr>
-              <a:t>P1.3			     //interrupt </a:t>
+              <a:t>P2.3			     //interrupt </a:t>
             </a:r>
             <a:r>
               <a:rPr lang="en-US" sz="1400" dirty="0">
@@ -12474,8 +12474,8 @@
         </p:nvSpPr>
         <p:spPr>
           <a:xfrm>
-            <a:off x="272139" y="609554"/>
-            <a:ext cx="8557536" cy="5747330"/>
+            <a:off x="272138" y="609554"/>
+            <a:ext cx="8776328" cy="5747330"/>
           </a:xfrm>
         </p:spPr>
         <p:txBody>
@@ -12599,7 +12599,7 @@
                 <a:latin typeface="Courier New" pitchFamily="49" charset="0"/>
                 <a:cs typeface="Courier New" pitchFamily="49" charset="0"/>
               </a:rPr>
-              <a:t>    P1DIR = BIT6;	</a:t>
+              <a:t>    P1DIR |= BIT6;	</a:t>
             </a:r>
             <a:r>
               <a:rPr lang="en-US" sz="1400" b="1" dirty="0">
@@ -12709,7 +12709,7 @@
                 <a:latin typeface="Courier New" pitchFamily="49" charset="0"/>
                 <a:cs typeface="Courier New" pitchFamily="49" charset="0"/>
               </a:rPr>
-              <a:t>   TACTL </a:t>
+              <a:t>   TA0CTL </a:t>
             </a:r>
             <a:r>
               <a:rPr lang="en-US" sz="1400" b="1" dirty="0">
@@ -12764,7 +12764,7 @@
                 <a:latin typeface="Courier New" pitchFamily="49" charset="0"/>
                 <a:cs typeface="Courier New" pitchFamily="49" charset="0"/>
               </a:rPr>
-              <a:t>    TACTL </a:t>
+              <a:t>    TA0CTL </a:t>
             </a:r>
             <a:r>
               <a:rPr lang="en-US" sz="1400" b="1" dirty="0">
@@ -13212,7 +13212,27 @@
                 <a:latin typeface="Courier New" pitchFamily="49" charset="0"/>
                 <a:cs typeface="Courier New" pitchFamily="49" charset="0"/>
               </a:rPr>
-              <a:t>	TACTL &amp;= ~TAIFG;	</a:t>
+              <a:t>	</a:t>
+            </a:r>
+            <a:r>
+              <a:rPr lang="en-US" sz="1400" b="1" dirty="0" smtClean="0">
+                <a:solidFill>
+                  <a:schemeClr val="accent2"/>
+                </a:solidFill>
+                <a:latin typeface="Courier New" pitchFamily="49" charset="0"/>
+                <a:cs typeface="Courier New" pitchFamily="49" charset="0"/>
+              </a:rPr>
+              <a:t>TA0CTL </a:t>
+            </a:r>
+            <a:r>
+              <a:rPr lang="en-US" sz="1400" b="1" dirty="0">
+                <a:solidFill>
+                  <a:schemeClr val="accent2"/>
+                </a:solidFill>
+                <a:latin typeface="Courier New" pitchFamily="49" charset="0"/>
+                <a:cs typeface="Courier New" pitchFamily="49" charset="0"/>
+              </a:rPr>
+              <a:t>&amp;= ~TAIFG;	</a:t>
             </a:r>
             <a:r>
               <a:rPr lang="en-US" sz="1400" b="1" dirty="0" smtClean="0">

</xml_diff>

<commit_message>
Fixing image link on Lesson 32, and fixing the interrupt example code on Lesson 25.
</commit_message>
<xml_diff>
--- a/notes/L26/Lsn26.pptx
+++ b/notes/L26/Lsn26.pptx
@@ -15384,39 +15384,16 @@
                 </a:solidFill>
                 <a:latin typeface="Consolas"/>
               </a:rPr>
-              <a:t>// clear TAR</a:t>
-            </a:r>
-          </a:p>
-          <a:p>
-            <a:pPr marL="0" indent="0">
-              <a:buNone/>
-            </a:pPr>
+              <a:t>// clear </a:t>
+            </a:r>
             <a:r>
               <a:rPr lang="en-US" sz="1200" dirty="0" smtClean="0">
                 <a:solidFill>
-                  <a:srgbClr val="000000"/>
-                </a:solidFill>
-                <a:latin typeface="Consolas"/>
-              </a:rPr>
-              <a:t>    TA0CTL </a:t>
-            </a:r>
-            <a:r>
-              <a:rPr lang="en-US" sz="1200" dirty="0">
-                <a:solidFill>
-                  <a:srgbClr val="000000"/>
-                </a:solidFill>
-                <a:latin typeface="Consolas"/>
-              </a:rPr>
-              <a:t>|= TASSEL1;           </a:t>
-            </a:r>
-            <a:r>
-              <a:rPr lang="en-US" sz="1200" dirty="0">
-                <a:solidFill>
                   <a:srgbClr val="3F7F5F"/>
                 </a:solidFill>
                 <a:latin typeface="Consolas"/>
               </a:rPr>
-              <a:t>// configure for SMCLK - what's the frequency (roughly)?</a:t>
+              <a:t>TAR</a:t>
             </a:r>
           </a:p>
           <a:p>
@@ -15429,11 +15406,20 @@
             <a:r>
               <a:rPr lang="en-US" sz="1200" dirty="0" smtClean="0">
                 <a:solidFill>
+                  <a:srgbClr val="3F7F5F"/>
+                </a:solidFill>
+                <a:latin typeface="Consolas"/>
+              </a:rPr>
+              <a:t>    </a:t>
+            </a:r>
+            <a:r>
+              <a:rPr lang="en-US" sz="1200" dirty="0" smtClean="0">
+                <a:solidFill>
                   <a:srgbClr val="000000"/>
                 </a:solidFill>
                 <a:latin typeface="Consolas"/>
               </a:rPr>
-              <a:t>    TA0CTL </a:t>
+              <a:t>TA0CTL </a:t>
             </a:r>
             <a:r>
               <a:rPr lang="en-US" sz="1200" dirty="0">
@@ -15442,7 +15428,7 @@
                 </a:solidFill>
                 <a:latin typeface="Consolas"/>
               </a:rPr>
-              <a:t>|= ID1|ID0;           </a:t>
+              <a:t>|= TASSEL_2;           </a:t>
             </a:r>
             <a:r>
               <a:rPr lang="en-US" sz="1200" dirty="0">
@@ -15451,7 +15437,7 @@
                 </a:solidFill>
                 <a:latin typeface="Consolas"/>
               </a:rPr>
-              <a:t>// divide clock by 8 - what's the frequency of interrupt?</a:t>
+              <a:t>// configure for SMCLK - what's the frequency (roughly)?</a:t>
             </a:r>
           </a:p>
           <a:p>
@@ -15462,31 +15448,22 @@
               <a:buNone/>
             </a:pPr>
             <a:r>
-              <a:rPr lang="en-US" sz="1200" dirty="0" smtClean="0">
+              <a:rPr lang="en-US" sz="1200" dirty="0">
                 <a:solidFill>
                   <a:srgbClr val="000000"/>
                 </a:solidFill>
                 <a:latin typeface="Consolas"/>
               </a:rPr>
-              <a:t>    TA0CTL </a:t>
+              <a:t>    TA0CTL |= ID_3;         	  </a:t>
             </a:r>
             <a:r>
               <a:rPr lang="en-US" sz="1200" dirty="0">
                 <a:solidFill>
-                  <a:srgbClr val="000000"/>
-                </a:solidFill>
-                <a:latin typeface="Consolas"/>
-              </a:rPr>
-              <a:t>&amp;= ~TAIFG;            </a:t>
-            </a:r>
-            <a:r>
-              <a:rPr lang="en-US" sz="1200" dirty="0">
-                <a:solidFill>
                   <a:srgbClr val="3F7F5F"/>
                 </a:solidFill>
                 <a:latin typeface="Consolas"/>
               </a:rPr>
-              <a:t>// clear interrupt flag</a:t>
+              <a:t>// divide clock by 8 - what's the frequency of interrupt?</a:t>
             </a:r>
           </a:p>
           <a:p>
@@ -15497,31 +15474,22 @@
               <a:buNone/>
             </a:pPr>
             <a:r>
-              <a:rPr lang="en-US" sz="1200" dirty="0" smtClean="0">
+              <a:rPr lang="en-US" sz="1200" dirty="0">
                 <a:solidFill>
                   <a:srgbClr val="000000"/>
                 </a:solidFill>
                 <a:latin typeface="Consolas"/>
               </a:rPr>
-              <a:t>    TA0CTL </a:t>
+              <a:t>    TA0CTL &amp;= ~TAIFG;            </a:t>
             </a:r>
             <a:r>
               <a:rPr lang="en-US" sz="1200" dirty="0">
                 <a:solidFill>
-                  <a:srgbClr val="000000"/>
-                </a:solidFill>
-                <a:latin typeface="Consolas"/>
-              </a:rPr>
-              <a:t>|= MC1;               </a:t>
-            </a:r>
-            <a:r>
-              <a:rPr lang="en-US" sz="1200" dirty="0">
-                <a:solidFill>
                   <a:srgbClr val="3F7F5F"/>
                 </a:solidFill>
                 <a:latin typeface="Consolas"/>
               </a:rPr>
-              <a:t>// set count mode to continuous</a:t>
+              <a:t>// clear interrupt flag</a:t>
             </a:r>
           </a:p>
           <a:p>
@@ -15532,13 +15500,57 @@
               <a:buNone/>
             </a:pPr>
             <a:r>
+              <a:rPr lang="en-US" sz="1200" dirty="0">
+                <a:solidFill>
+                  <a:srgbClr val="000000"/>
+                </a:solidFill>
+                <a:latin typeface="Consolas"/>
+              </a:rPr>
+              <a:t>    TA0CTL |= MC_1;               </a:t>
+            </a:r>
+            <a:r>
+              <a:rPr lang="en-US" sz="1200" dirty="0">
+                <a:solidFill>
+                  <a:srgbClr val="3F7F5F"/>
+                </a:solidFill>
+                <a:latin typeface="Consolas"/>
+              </a:rPr>
+              <a:t>// set count mode to </a:t>
+            </a:r>
+            <a:r>
               <a:rPr lang="en-US" sz="1200" dirty="0" smtClean="0">
                 <a:solidFill>
+                  <a:srgbClr val="3F7F5F"/>
+                </a:solidFill>
+                <a:latin typeface="Consolas"/>
+              </a:rPr>
+              <a:t>continuous</a:t>
+            </a:r>
+          </a:p>
+          <a:p>
+            <a:pPr marL="0" indent="0">
+              <a:spcBef>
+                <a:spcPts val="0"/>
+              </a:spcBef>
+              <a:buNone/>
+            </a:pPr>
+            <a:r>
+              <a:rPr lang="en-US" sz="1200" dirty="0" smtClean="0">
+                <a:solidFill>
                   <a:srgbClr val="000000"/>
                 </a:solidFill>
                 <a:latin typeface="Consolas"/>
               </a:rPr>
-              <a:t>    TA0CTL </a:t>
+              <a:t>    </a:t>
+            </a:r>
+            <a:r>
+              <a:rPr lang="en-US" sz="1200" dirty="0" smtClean="0">
+                <a:solidFill>
+                  <a:srgbClr val="000000"/>
+                </a:solidFill>
+                <a:latin typeface="Consolas"/>
+              </a:rPr>
+              <a:t>TA0CTL </a:t>
             </a:r>
             <a:r>
               <a:rPr lang="en-US" sz="1200" dirty="0">

</xml_diff>